<commit_message>
Finishign dissertation formatting and stuff
</commit_message>
<xml_diff>
--- a/Dissertation Backup/Editing Pcrit Fig.pptx
+++ b/Dissertation Backup/Editing Pcrit Fig.pptx
@@ -243,7 +243,7 @@
           <a:p>
             <a:fld id="{5CE52A9B-7AC3-41C1-AEC8-74F70DF2B866}" type="datetimeFigureOut">
               <a:rPr lang="en-US" smtClean="0"/>
-              <a:t>3/31/2023</a:t>
+              <a:t>4/5/2023</a:t>
             </a:fld>
             <a:endParaRPr lang="en-US"/>
           </a:p>
@@ -413,7 +413,7 @@
           <a:p>
             <a:fld id="{5CE52A9B-7AC3-41C1-AEC8-74F70DF2B866}" type="datetimeFigureOut">
               <a:rPr lang="en-US" smtClean="0"/>
-              <a:t>3/31/2023</a:t>
+              <a:t>4/5/2023</a:t>
             </a:fld>
             <a:endParaRPr lang="en-US"/>
           </a:p>
@@ -593,7 +593,7 @@
           <a:p>
             <a:fld id="{5CE52A9B-7AC3-41C1-AEC8-74F70DF2B866}" type="datetimeFigureOut">
               <a:rPr lang="en-US" smtClean="0"/>
-              <a:t>3/31/2023</a:t>
+              <a:t>4/5/2023</a:t>
             </a:fld>
             <a:endParaRPr lang="en-US"/>
           </a:p>
@@ -763,7 +763,7 @@
           <a:p>
             <a:fld id="{5CE52A9B-7AC3-41C1-AEC8-74F70DF2B866}" type="datetimeFigureOut">
               <a:rPr lang="en-US" smtClean="0"/>
-              <a:t>3/31/2023</a:t>
+              <a:t>4/5/2023</a:t>
             </a:fld>
             <a:endParaRPr lang="en-US"/>
           </a:p>
@@ -1009,7 +1009,7 @@
           <a:p>
             <a:fld id="{5CE52A9B-7AC3-41C1-AEC8-74F70DF2B866}" type="datetimeFigureOut">
               <a:rPr lang="en-US" smtClean="0"/>
-              <a:t>3/31/2023</a:t>
+              <a:t>4/5/2023</a:t>
             </a:fld>
             <a:endParaRPr lang="en-US"/>
           </a:p>
@@ -1241,7 +1241,7 @@
           <a:p>
             <a:fld id="{5CE52A9B-7AC3-41C1-AEC8-74F70DF2B866}" type="datetimeFigureOut">
               <a:rPr lang="en-US" smtClean="0"/>
-              <a:t>3/31/2023</a:t>
+              <a:t>4/5/2023</a:t>
             </a:fld>
             <a:endParaRPr lang="en-US"/>
           </a:p>
@@ -1608,7 +1608,7 @@
           <a:p>
             <a:fld id="{5CE52A9B-7AC3-41C1-AEC8-74F70DF2B866}" type="datetimeFigureOut">
               <a:rPr lang="en-US" smtClean="0"/>
-              <a:t>3/31/2023</a:t>
+              <a:t>4/5/2023</a:t>
             </a:fld>
             <a:endParaRPr lang="en-US"/>
           </a:p>
@@ -1726,7 +1726,7 @@
           <a:p>
             <a:fld id="{5CE52A9B-7AC3-41C1-AEC8-74F70DF2B866}" type="datetimeFigureOut">
               <a:rPr lang="en-US" smtClean="0"/>
-              <a:t>3/31/2023</a:t>
+              <a:t>4/5/2023</a:t>
             </a:fld>
             <a:endParaRPr lang="en-US"/>
           </a:p>
@@ -1821,7 +1821,7 @@
           <a:p>
             <a:fld id="{5CE52A9B-7AC3-41C1-AEC8-74F70DF2B866}" type="datetimeFigureOut">
               <a:rPr lang="en-US" smtClean="0"/>
-              <a:t>3/31/2023</a:t>
+              <a:t>4/5/2023</a:t>
             </a:fld>
             <a:endParaRPr lang="en-US"/>
           </a:p>
@@ -2098,7 +2098,7 @@
           <a:p>
             <a:fld id="{5CE52A9B-7AC3-41C1-AEC8-74F70DF2B866}" type="datetimeFigureOut">
               <a:rPr lang="en-US" smtClean="0"/>
-              <a:t>3/31/2023</a:t>
+              <a:t>4/5/2023</a:t>
             </a:fld>
             <a:endParaRPr lang="en-US"/>
           </a:p>
@@ -2355,7 +2355,7 @@
           <a:p>
             <a:fld id="{5CE52A9B-7AC3-41C1-AEC8-74F70DF2B866}" type="datetimeFigureOut">
               <a:rPr lang="en-US" smtClean="0"/>
-              <a:t>3/31/2023</a:t>
+              <a:t>4/5/2023</a:t>
             </a:fld>
             <a:endParaRPr lang="en-US"/>
           </a:p>
@@ -2568,7 +2568,7 @@
           <a:p>
             <a:fld id="{5CE52A9B-7AC3-41C1-AEC8-74F70DF2B866}" type="datetimeFigureOut">
               <a:rPr lang="en-US" smtClean="0"/>
-              <a:t>3/31/2023</a:t>
+              <a:t>4/5/2023</a:t>
             </a:fld>
             <a:endParaRPr lang="en-US"/>
           </a:p>
@@ -3011,132 +3011,6 @@
       </p:pic>
       <p:sp>
         <p:nvSpPr>
-          <p:cNvPr id="31" name="TextBox 30">
-            <a:extLst>
-              <a:ext uri="{FF2B5EF4-FFF2-40B4-BE49-F238E27FC236}">
-                <a16:creationId xmlns:a16="http://schemas.microsoft.com/office/drawing/2014/main" id="{5B3F18B0-F5FF-7534-4EE6-65438659D18A}"/>
-              </a:ext>
-            </a:extLst>
-          </p:cNvPr>
-          <p:cNvSpPr txBox="1"/>
-          <p:nvPr/>
-        </p:nvSpPr>
-        <p:spPr>
-          <a:xfrm>
-            <a:off x="7124700" y="4526280"/>
-            <a:ext cx="662940" cy="769441"/>
-          </a:xfrm>
-          <a:prstGeom prst="rect">
-            <a:avLst/>
-          </a:prstGeom>
-          <a:noFill/>
-        </p:spPr>
-        <p:txBody>
-          <a:bodyPr wrap="square" rtlCol="0">
-            <a:spAutoFit/>
-          </a:bodyPr>
-          <a:lstStyle/>
-          <a:p>
-            <a:r>
-              <a:rPr lang="en-US" sz="4400" dirty="0">
-                <a:latin typeface="Arial" panose="020B0604020202020204" pitchFamily="34" charset="0"/>
-                <a:cs typeface="Arial" panose="020B0604020202020204" pitchFamily="34" charset="0"/>
-              </a:rPr>
-              <a:t>b</a:t>
-            </a:r>
-            <a:endParaRPr lang="en-US" dirty="0">
-              <a:latin typeface="Arial" panose="020B0604020202020204" pitchFamily="34" charset="0"/>
-              <a:cs typeface="Arial" panose="020B0604020202020204" pitchFamily="34" charset="0"/>
-            </a:endParaRPr>
-          </a:p>
-        </p:txBody>
-      </p:sp>
-      <p:sp>
-        <p:nvSpPr>
-          <p:cNvPr id="32" name="TextBox 31">
-            <a:extLst>
-              <a:ext uri="{FF2B5EF4-FFF2-40B4-BE49-F238E27FC236}">
-                <a16:creationId xmlns:a16="http://schemas.microsoft.com/office/drawing/2014/main" id="{FBE95AC1-38B4-3A8E-7201-2CE1A8DCC30E}"/>
-              </a:ext>
-            </a:extLst>
-          </p:cNvPr>
-          <p:cNvSpPr txBox="1"/>
-          <p:nvPr/>
-        </p:nvSpPr>
-        <p:spPr>
-          <a:xfrm>
-            <a:off x="4554220" y="5664200"/>
-            <a:ext cx="662940" cy="769441"/>
-          </a:xfrm>
-          <a:prstGeom prst="rect">
-            <a:avLst/>
-          </a:prstGeom>
-          <a:noFill/>
-        </p:spPr>
-        <p:txBody>
-          <a:bodyPr wrap="square" rtlCol="0">
-            <a:spAutoFit/>
-          </a:bodyPr>
-          <a:lstStyle/>
-          <a:p>
-            <a:r>
-              <a:rPr lang="en-US" sz="4400" dirty="0">
-                <a:latin typeface="Arial" panose="020B0604020202020204" pitchFamily="34" charset="0"/>
-                <a:cs typeface="Arial" panose="020B0604020202020204" pitchFamily="34" charset="0"/>
-              </a:rPr>
-              <a:t>a</a:t>
-            </a:r>
-            <a:endParaRPr lang="en-US" dirty="0">
-              <a:latin typeface="Arial" panose="020B0604020202020204" pitchFamily="34" charset="0"/>
-              <a:cs typeface="Arial" panose="020B0604020202020204" pitchFamily="34" charset="0"/>
-            </a:endParaRPr>
-          </a:p>
-        </p:txBody>
-      </p:sp>
-      <p:sp>
-        <p:nvSpPr>
-          <p:cNvPr id="33" name="TextBox 32">
-            <a:extLst>
-              <a:ext uri="{FF2B5EF4-FFF2-40B4-BE49-F238E27FC236}">
-                <a16:creationId xmlns:a16="http://schemas.microsoft.com/office/drawing/2014/main" id="{CB32F0E5-989D-E468-4A50-5DA0A29A0939}"/>
-              </a:ext>
-            </a:extLst>
-          </p:cNvPr>
-          <p:cNvSpPr txBox="1"/>
-          <p:nvPr/>
-        </p:nvSpPr>
-        <p:spPr>
-          <a:xfrm>
-            <a:off x="2532380" y="5908040"/>
-            <a:ext cx="662940" cy="769441"/>
-          </a:xfrm>
-          <a:prstGeom prst="rect">
-            <a:avLst/>
-          </a:prstGeom>
-          <a:noFill/>
-        </p:spPr>
-        <p:txBody>
-          <a:bodyPr wrap="square" rtlCol="0">
-            <a:spAutoFit/>
-          </a:bodyPr>
-          <a:lstStyle/>
-          <a:p>
-            <a:r>
-              <a:rPr lang="en-US" sz="4400" dirty="0">
-                <a:latin typeface="Arial" panose="020B0604020202020204" pitchFamily="34" charset="0"/>
-                <a:cs typeface="Arial" panose="020B0604020202020204" pitchFamily="34" charset="0"/>
-              </a:rPr>
-              <a:t>a</a:t>
-            </a:r>
-            <a:endParaRPr lang="en-US" dirty="0">
-              <a:latin typeface="Arial" panose="020B0604020202020204" pitchFamily="34" charset="0"/>
-              <a:cs typeface="Arial" panose="020B0604020202020204" pitchFamily="34" charset="0"/>
-            </a:endParaRPr>
-          </a:p>
-        </p:txBody>
-      </p:sp>
-      <p:sp>
-        <p:nvSpPr>
           <p:cNvPr id="34" name="TextBox 33">
             <a:extLst>
               <a:ext uri="{FF2B5EF4-FFF2-40B4-BE49-F238E27FC236}">

</xml_diff>

<commit_message>
Statistical analyses and figures for updates to Ch2
</commit_message>
<xml_diff>
--- a/Dissertation Backup/Editing Pcrit Fig.pptx
+++ b/Dissertation Backup/Editing Pcrit Fig.pptx
@@ -243,7 +243,7 @@
           <a:p>
             <a:fld id="{5CE52A9B-7AC3-41C1-AEC8-74F70DF2B866}" type="datetimeFigureOut">
               <a:rPr lang="en-US" smtClean="0"/>
-              <a:t>4/5/2023</a:t>
+              <a:t>6/30/2023</a:t>
             </a:fld>
             <a:endParaRPr lang="en-US"/>
           </a:p>
@@ -413,7 +413,7 @@
           <a:p>
             <a:fld id="{5CE52A9B-7AC3-41C1-AEC8-74F70DF2B866}" type="datetimeFigureOut">
               <a:rPr lang="en-US" smtClean="0"/>
-              <a:t>4/5/2023</a:t>
+              <a:t>6/30/2023</a:t>
             </a:fld>
             <a:endParaRPr lang="en-US"/>
           </a:p>
@@ -593,7 +593,7 @@
           <a:p>
             <a:fld id="{5CE52A9B-7AC3-41C1-AEC8-74F70DF2B866}" type="datetimeFigureOut">
               <a:rPr lang="en-US" smtClean="0"/>
-              <a:t>4/5/2023</a:t>
+              <a:t>6/30/2023</a:t>
             </a:fld>
             <a:endParaRPr lang="en-US"/>
           </a:p>
@@ -763,7 +763,7 @@
           <a:p>
             <a:fld id="{5CE52A9B-7AC3-41C1-AEC8-74F70DF2B866}" type="datetimeFigureOut">
               <a:rPr lang="en-US" smtClean="0"/>
-              <a:t>4/5/2023</a:t>
+              <a:t>6/30/2023</a:t>
             </a:fld>
             <a:endParaRPr lang="en-US"/>
           </a:p>
@@ -1009,7 +1009,7 @@
           <a:p>
             <a:fld id="{5CE52A9B-7AC3-41C1-AEC8-74F70DF2B866}" type="datetimeFigureOut">
               <a:rPr lang="en-US" smtClean="0"/>
-              <a:t>4/5/2023</a:t>
+              <a:t>6/30/2023</a:t>
             </a:fld>
             <a:endParaRPr lang="en-US"/>
           </a:p>
@@ -1241,7 +1241,7 @@
           <a:p>
             <a:fld id="{5CE52A9B-7AC3-41C1-AEC8-74F70DF2B866}" type="datetimeFigureOut">
               <a:rPr lang="en-US" smtClean="0"/>
-              <a:t>4/5/2023</a:t>
+              <a:t>6/30/2023</a:t>
             </a:fld>
             <a:endParaRPr lang="en-US"/>
           </a:p>
@@ -1608,7 +1608,7 @@
           <a:p>
             <a:fld id="{5CE52A9B-7AC3-41C1-AEC8-74F70DF2B866}" type="datetimeFigureOut">
               <a:rPr lang="en-US" smtClean="0"/>
-              <a:t>4/5/2023</a:t>
+              <a:t>6/30/2023</a:t>
             </a:fld>
             <a:endParaRPr lang="en-US"/>
           </a:p>
@@ -1726,7 +1726,7 @@
           <a:p>
             <a:fld id="{5CE52A9B-7AC3-41C1-AEC8-74F70DF2B866}" type="datetimeFigureOut">
               <a:rPr lang="en-US" smtClean="0"/>
-              <a:t>4/5/2023</a:t>
+              <a:t>6/30/2023</a:t>
             </a:fld>
             <a:endParaRPr lang="en-US"/>
           </a:p>
@@ -1821,7 +1821,7 @@
           <a:p>
             <a:fld id="{5CE52A9B-7AC3-41C1-AEC8-74F70DF2B866}" type="datetimeFigureOut">
               <a:rPr lang="en-US" smtClean="0"/>
-              <a:t>4/5/2023</a:t>
+              <a:t>6/30/2023</a:t>
             </a:fld>
             <a:endParaRPr lang="en-US"/>
           </a:p>
@@ -2098,7 +2098,7 @@
           <a:p>
             <a:fld id="{5CE52A9B-7AC3-41C1-AEC8-74F70DF2B866}" type="datetimeFigureOut">
               <a:rPr lang="en-US" smtClean="0"/>
-              <a:t>4/5/2023</a:t>
+              <a:t>6/30/2023</a:t>
             </a:fld>
             <a:endParaRPr lang="en-US"/>
           </a:p>
@@ -2355,7 +2355,7 @@
           <a:p>
             <a:fld id="{5CE52A9B-7AC3-41C1-AEC8-74F70DF2B866}" type="datetimeFigureOut">
               <a:rPr lang="en-US" smtClean="0"/>
-              <a:t>4/5/2023</a:t>
+              <a:t>6/30/2023</a:t>
             </a:fld>
             <a:endParaRPr lang="en-US"/>
           </a:p>
@@ -2568,7 +2568,7 @@
           <a:p>
             <a:fld id="{5CE52A9B-7AC3-41C1-AEC8-74F70DF2B866}" type="datetimeFigureOut">
               <a:rPr lang="en-US" smtClean="0"/>
-              <a:t>4/5/2023</a:t>
+              <a:t>6/30/2023</a:t>
             </a:fld>
             <a:endParaRPr lang="en-US"/>
           </a:p>
@@ -2975,10 +2975,10 @@
       </p:grpSpPr>
       <p:pic>
         <p:nvPicPr>
-          <p:cNvPr id="30" name="Picture 29" descr="Diagram&#10;&#10;Description automatically generated">
+          <p:cNvPr id="3" name="Picture 2">
             <a:extLst>
               <a:ext uri="{FF2B5EF4-FFF2-40B4-BE49-F238E27FC236}">
-                <a16:creationId xmlns:a16="http://schemas.microsoft.com/office/drawing/2014/main" id="{F0354FBE-4DBF-CA23-A17B-5C1440FA53D0}"/>
+                <a16:creationId xmlns:a16="http://schemas.microsoft.com/office/drawing/2014/main" id="{0B49DFCF-4E46-CB5E-9998-F54A34D8314B}"/>
               </a:ext>
             </a:extLst>
           </p:cNvPr>
@@ -2987,22 +2987,15 @@
           </p:cNvPicPr>
           <p:nvPr/>
         </p:nvPicPr>
-        <p:blipFill>
-          <a:blip r:embed="rId2">
-            <a:extLst>
-              <a:ext uri="{28A0092B-C50C-407E-A947-70E740481C1C}">
-                <a14:useLocalDpi xmlns:a14="http://schemas.microsoft.com/office/drawing/2010/main" val="0"/>
-              </a:ext>
-            </a:extLst>
-          </a:blip>
-          <a:stretch>
-            <a:fillRect/>
-          </a:stretch>
+        <p:blipFill rotWithShape="1">
+          <a:blip r:embed="rId2"/>
+          <a:srcRect r="312"/>
+          <a:stretch/>
         </p:blipFill>
         <p:spPr>
           <a:xfrm>
-            <a:off x="942975" y="3120390"/>
-            <a:ext cx="25546050" cy="10218420"/>
+            <a:off x="236441" y="3180498"/>
+            <a:ext cx="26890759" cy="10093049"/>
           </a:xfrm>
           <a:prstGeom prst="rect">
             <a:avLst/>
@@ -3023,7 +3016,7 @@
         </p:nvSpPr>
         <p:spPr>
           <a:xfrm>
-            <a:off x="9860280" y="5523319"/>
+            <a:off x="9558307" y="5523319"/>
             <a:ext cx="662940" cy="769441"/>
           </a:xfrm>
           <a:prstGeom prst="rect">
@@ -3065,7 +3058,7 @@
         </p:nvSpPr>
         <p:spPr>
           <a:xfrm>
-            <a:off x="10855960" y="6666319"/>
+            <a:off x="10590487" y="6666319"/>
             <a:ext cx="1051560" cy="769441"/>
           </a:xfrm>
           <a:prstGeom prst="rect">
@@ -3107,7 +3100,7 @@
         </p:nvSpPr>
         <p:spPr>
           <a:xfrm>
-            <a:off x="13245614" y="7295066"/>
+            <a:off x="13068632" y="7295066"/>
             <a:ext cx="662940" cy="769441"/>
           </a:xfrm>
           <a:prstGeom prst="rect">
@@ -3149,7 +3142,7 @@
         </p:nvSpPr>
         <p:spPr>
           <a:xfrm>
-            <a:off x="16449987" y="5571602"/>
+            <a:off x="16656466" y="5571602"/>
             <a:ext cx="662940" cy="769441"/>
           </a:xfrm>
           <a:prstGeom prst="rect">
@@ -3191,7 +3184,7 @@
         </p:nvSpPr>
         <p:spPr>
           <a:xfrm>
-            <a:off x="18303862" y="6548274"/>
+            <a:off x="18746315" y="6548274"/>
             <a:ext cx="817513" cy="769441"/>
           </a:xfrm>
           <a:prstGeom prst="rect">
@@ -3233,7 +3226,7 @@
         </p:nvSpPr>
         <p:spPr>
           <a:xfrm>
-            <a:off x="21023917" y="7608846"/>
+            <a:off x="21554863" y="7608846"/>
             <a:ext cx="662940" cy="769441"/>
           </a:xfrm>
           <a:prstGeom prst="rect">
@@ -3275,7 +3268,7 @@
         </p:nvSpPr>
         <p:spPr>
           <a:xfrm>
-            <a:off x="20192469" y="8525176"/>
+            <a:off x="20457942" y="8525176"/>
             <a:ext cx="662940" cy="769441"/>
           </a:xfrm>
           <a:prstGeom prst="rect">
@@ -3359,7 +3352,7 @@
         </p:nvSpPr>
         <p:spPr>
           <a:xfrm>
-            <a:off x="16804607" y="7448584"/>
+            <a:off x="16952092" y="7448584"/>
             <a:ext cx="662940" cy="769441"/>
           </a:xfrm>
           <a:prstGeom prst="rect">

</xml_diff>